<commit_message>
add concept for PPP
</commit_message>
<xml_diff>
--- a/doc/task14/Task14.pptx
+++ b/doc/task14/Task14.pptx
@@ -5,17 +5,26 @@
     <p:sldMasterId id="2147483669" r:id="rId4"/>
   </p:sldMasterIdLst>
   <p:notesMasterIdLst>
-    <p:notesMasterId r:id="rId10"/>
+    <p:notesMasterId r:id="rId19"/>
   </p:notesMasterIdLst>
   <p:handoutMasterIdLst>
-    <p:handoutMasterId r:id="rId11"/>
+    <p:handoutMasterId r:id="rId20"/>
   </p:handoutMasterIdLst>
   <p:sldIdLst>
     <p:sldId id="259" r:id="rId5"/>
     <p:sldId id="310" r:id="rId6"/>
     <p:sldId id="309" r:id="rId7"/>
     <p:sldId id="308" r:id="rId8"/>
-    <p:sldId id="305" r:id="rId9"/>
+    <p:sldId id="312" r:id="rId9"/>
+    <p:sldId id="313" r:id="rId10"/>
+    <p:sldId id="314" r:id="rId11"/>
+    <p:sldId id="315" r:id="rId12"/>
+    <p:sldId id="316" r:id="rId13"/>
+    <p:sldId id="311" r:id="rId14"/>
+    <p:sldId id="318" r:id="rId15"/>
+    <p:sldId id="317" r:id="rId16"/>
+    <p:sldId id="319" r:id="rId17"/>
+    <p:sldId id="305" r:id="rId18"/>
   </p:sldIdLst>
   <p:sldSz cx="9144000" cy="6858000" type="screen4x3"/>
   <p:notesSz cx="6669088" cy="9926638"/>
@@ -259,7 +268,7 @@
           <a:p>
             <a:fld id="{EFA0D184-D464-48E9-9CA0-A94E873F6C2C}" type="datetimeFigureOut">
               <a:rPr lang="de-CH" smtClean="0"/>
-              <a:t>18.01.16</a:t>
+              <a:t>tt.01.jjjj</a:t>
             </a:fld>
             <a:endParaRPr lang="de-CH"/>
           </a:p>
@@ -424,7 +433,7 @@
           <a:p>
             <a:fld id="{5AF2B663-2BA9-4D7E-8201-5DE4109E1EDD}" type="datetimeFigureOut">
               <a:rPr lang="de-CH" smtClean="0"/>
-              <a:t>18.01.16</a:t>
+              <a:t>tt.01.jjjj</a:t>
             </a:fld>
             <a:endParaRPr lang="de-CH"/>
           </a:p>
@@ -776,6 +785,90 @@
 </p:notes>
 </file>
 
+<file path=ppt/notesSlides/notesSlide2.xml><?xml version="1.0" encoding="utf-8"?>
+<p:notes xmlns:a="http://schemas.openxmlformats.org/drawingml/2006/main" xmlns:r="http://schemas.openxmlformats.org/officeDocument/2006/relationships" xmlns:p="http://schemas.openxmlformats.org/presentationml/2006/main">
+  <p:cSld>
+    <p:spTree>
+      <p:nvGrpSpPr>
+        <p:cNvPr id="1" name=""/>
+        <p:cNvGrpSpPr/>
+        <p:nvPr/>
+      </p:nvGrpSpPr>
+      <p:grpSpPr>
+        <a:xfrm>
+          <a:off x="0" y="0"/>
+          <a:ext cx="0" cy="0"/>
+          <a:chOff x="0" y="0"/>
+          <a:chExt cx="0" cy="0"/>
+        </a:xfrm>
+      </p:grpSpPr>
+      <p:sp>
+        <p:nvSpPr>
+          <p:cNvPr id="2" name="Folienbildplatzhalter 1"/>
+          <p:cNvSpPr>
+            <a:spLocks noGrp="1" noRot="1" noChangeAspect="1"/>
+          </p:cNvSpPr>
+          <p:nvPr>
+            <p:ph type="sldImg"/>
+          </p:nvPr>
+        </p:nvSpPr>
+        <p:spPr/>
+      </p:sp>
+      <p:sp>
+        <p:nvSpPr>
+          <p:cNvPr id="3" name="Notizenplatzhalter 2"/>
+          <p:cNvSpPr>
+            <a:spLocks noGrp="1"/>
+          </p:cNvSpPr>
+          <p:nvPr>
+            <p:ph type="body" idx="1"/>
+          </p:nvPr>
+        </p:nvSpPr>
+        <p:spPr/>
+        <p:txBody>
+          <a:bodyPr/>
+          <a:lstStyle/>
+          <a:p>
+            <a:endParaRPr lang="de-CH" dirty="0"/>
+          </a:p>
+        </p:txBody>
+      </p:sp>
+      <p:sp>
+        <p:nvSpPr>
+          <p:cNvPr id="4" name="Foliennummernplatzhalter 3"/>
+          <p:cNvSpPr>
+            <a:spLocks noGrp="1"/>
+          </p:cNvSpPr>
+          <p:nvPr>
+            <p:ph type="sldNum" sz="quarter" idx="10"/>
+          </p:nvPr>
+        </p:nvSpPr>
+        <p:spPr/>
+        <p:txBody>
+          <a:bodyPr/>
+          <a:lstStyle/>
+          <a:p>
+            <a:fld id="{37E44704-8E6D-4CF2-8CFA-A0F7BC751896}" type="slidenum">
+              <a:rPr lang="de-CH" smtClean="0"/>
+              <a:t>13</a:t>
+            </a:fld>
+            <a:endParaRPr lang="de-CH"/>
+          </a:p>
+        </p:txBody>
+      </p:sp>
+    </p:spTree>
+    <p:extLst>
+      <p:ext uri="{BB962C8B-B14F-4D97-AF65-F5344CB8AC3E}">
+        <p14:creationId xmlns:p14="http://schemas.microsoft.com/office/powerpoint/2010/main" val="1632356723"/>
+      </p:ext>
+    </p:extLst>
+  </p:cSld>
+  <p:clrMapOvr>
+    <a:masterClrMapping/>
+  </p:clrMapOvr>
+</p:notes>
+</file>
+
 <file path=ppt/slideLayouts/slideLayout1.xml><?xml version="1.0" encoding="utf-8"?>
 <p:sldLayout xmlns:a="http://schemas.openxmlformats.org/drawingml/2006/main" xmlns:r="http://schemas.openxmlformats.org/officeDocument/2006/relationships" xmlns:p="http://schemas.openxmlformats.org/presentationml/2006/main" preserve="1" userDrawn="1">
   <p:cSld name="Titelfolie mit Bild">
@@ -6300,13 +6393,6 @@
     <p:sldLayoutId id="2147483789" r:id="rId10"/>
     <p:sldLayoutId id="2147483790" r:id="rId11"/>
   </p:sldLayoutIdLst>
-  <p:timing>
-    <p:tnLst>
-      <p:par>
-        <p:cTn id="1" dur="indefinite" restart="never" nodeType="tmRoot"/>
-      </p:par>
-    </p:tnLst>
-  </p:timing>
   <p:hf sldNum="0" hdr="0" ftr="0" dt="0"/>
   <p:txStyles>
     <p:titleStyle>
@@ -6801,13 +6887,409 @@
   <p:clrMapOvr>
     <a:masterClrMapping/>
   </p:clrMapOvr>
-  <p:timing>
-    <p:tnLst>
-      <p:par>
-        <p:cTn id="1" dur="indefinite" restart="never" nodeType="tmRoot"/>
-      </p:par>
-    </p:tnLst>
-  </p:timing>
+</p:sld>
+</file>
+
+<file path=ppt/slides/slide10.xml><?xml version="1.0" encoding="utf-8"?>
+<p:sld xmlns:a="http://schemas.openxmlformats.org/drawingml/2006/main" xmlns:r="http://schemas.openxmlformats.org/officeDocument/2006/relationships" xmlns:p="http://schemas.openxmlformats.org/presentationml/2006/main">
+  <p:cSld>
+    <p:spTree>
+      <p:nvGrpSpPr>
+        <p:cNvPr id="1" name=""/>
+        <p:cNvGrpSpPr/>
+        <p:nvPr/>
+      </p:nvGrpSpPr>
+      <p:grpSpPr>
+        <a:xfrm>
+          <a:off x="0" y="0"/>
+          <a:ext cx="0" cy="0"/>
+          <a:chOff x="0" y="0"/>
+          <a:chExt cx="0" cy="0"/>
+        </a:xfrm>
+      </p:grpSpPr>
+      <p:sp>
+        <p:nvSpPr>
+          <p:cNvPr id="4" name="Title 3"/>
+          <p:cNvSpPr>
+            <a:spLocks noGrp="1"/>
+          </p:cNvSpPr>
+          <p:nvPr>
+            <p:ph type="ctrTitle"/>
+          </p:nvPr>
+        </p:nvSpPr>
+        <p:spPr/>
+        <p:txBody>
+          <a:bodyPr/>
+          <a:lstStyle/>
+          <a:p>
+            <a:r>
+              <a:rPr lang="de-CH" dirty="0" err="1" smtClean="0"/>
+              <a:t>Lessons</a:t>
+            </a:r>
+            <a:r>
+              <a:rPr lang="de-CH" dirty="0" smtClean="0"/>
+              <a:t> </a:t>
+            </a:r>
+            <a:r>
+              <a:rPr lang="de-CH" dirty="0" err="1" smtClean="0"/>
+              <a:t>learnt</a:t>
+            </a:r>
+            <a:endParaRPr lang="de-CH" dirty="0"/>
+          </a:p>
+        </p:txBody>
+      </p:sp>
+      <p:sp>
+        <p:nvSpPr>
+          <p:cNvPr id="5" name="Subtitle 4"/>
+          <p:cNvSpPr>
+            <a:spLocks noGrp="1"/>
+          </p:cNvSpPr>
+          <p:nvPr>
+            <p:ph type="subTitle" idx="1"/>
+          </p:nvPr>
+        </p:nvSpPr>
+        <p:spPr/>
+        <p:txBody>
+          <a:bodyPr/>
+          <a:lstStyle/>
+          <a:p>
+            <a:endParaRPr lang="de-CH"/>
+          </a:p>
+        </p:txBody>
+      </p:sp>
+    </p:spTree>
+    <p:extLst>
+      <p:ext uri="{BB962C8B-B14F-4D97-AF65-F5344CB8AC3E}">
+        <p14:creationId xmlns:p14="http://schemas.microsoft.com/office/powerpoint/2010/main" val="4126872880"/>
+      </p:ext>
+    </p:extLst>
+  </p:cSld>
+  <p:clrMapOvr>
+    <a:masterClrMapping/>
+  </p:clrMapOvr>
+</p:sld>
+</file>
+
+<file path=ppt/slides/slide11.xml><?xml version="1.0" encoding="utf-8"?>
+<p:sld xmlns:a="http://schemas.openxmlformats.org/drawingml/2006/main" xmlns:r="http://schemas.openxmlformats.org/officeDocument/2006/relationships" xmlns:p="http://schemas.openxmlformats.org/presentationml/2006/main">
+  <p:cSld>
+    <p:spTree>
+      <p:nvGrpSpPr>
+        <p:cNvPr id="1" name=""/>
+        <p:cNvGrpSpPr/>
+        <p:nvPr/>
+      </p:nvGrpSpPr>
+      <p:grpSpPr>
+        <a:xfrm>
+          <a:off x="0" y="0"/>
+          <a:ext cx="0" cy="0"/>
+          <a:chOff x="0" y="0"/>
+          <a:chExt cx="0" cy="0"/>
+        </a:xfrm>
+      </p:grpSpPr>
+      <p:sp>
+        <p:nvSpPr>
+          <p:cNvPr id="2" name="Inhaltsplatzhalter 1"/>
+          <p:cNvSpPr>
+            <a:spLocks noGrp="1"/>
+          </p:cNvSpPr>
+          <p:nvPr>
+            <p:ph sz="half" idx="1"/>
+          </p:nvPr>
+        </p:nvSpPr>
+        <p:spPr/>
+        <p:txBody>
+          <a:bodyPr/>
+          <a:lstStyle/>
+          <a:p>
+            <a:endParaRPr lang="de-CH" dirty="0" smtClean="0"/>
+          </a:p>
+        </p:txBody>
+      </p:sp>
+      <p:sp>
+        <p:nvSpPr>
+          <p:cNvPr id="3" name="Titel 2"/>
+          <p:cNvSpPr>
+            <a:spLocks noGrp="1"/>
+          </p:cNvSpPr>
+          <p:nvPr>
+            <p:ph type="ctrTitle"/>
+          </p:nvPr>
+        </p:nvSpPr>
+        <p:spPr/>
+        <p:txBody>
+          <a:bodyPr/>
+          <a:lstStyle/>
+          <a:p>
+            <a:r>
+              <a:rPr lang="de-CH" sz="2000" dirty="0" err="1" smtClean="0"/>
+              <a:t>storyboard</a:t>
+            </a:r>
+            <a:r>
+              <a:rPr lang="de-CH" sz="2000" dirty="0" smtClean="0"/>
+              <a:t> </a:t>
+            </a:r>
+            <a:r>
+              <a:rPr lang="de-CH" sz="2000" dirty="0"/>
+              <a:t>↔ </a:t>
+            </a:r>
+            <a:r>
+              <a:rPr lang="de-CH" sz="2000" dirty="0" err="1"/>
+              <a:t>requirements</a:t>
+            </a:r>
+            <a:r>
+              <a:rPr lang="de-CH" sz="2000" dirty="0"/>
+              <a:t> ↔design ↔</a:t>
+            </a:r>
+            <a:r>
+              <a:rPr lang="de-CH" sz="2000" dirty="0" err="1"/>
+              <a:t>implementation</a:t>
+            </a:r>
+            <a:endParaRPr lang="de-CH" sz="2000" dirty="0"/>
+          </a:p>
+        </p:txBody>
+      </p:sp>
+    </p:spTree>
+    <p:extLst>
+      <p:ext uri="{BB962C8B-B14F-4D97-AF65-F5344CB8AC3E}">
+        <p14:creationId xmlns:p14="http://schemas.microsoft.com/office/powerpoint/2010/main" val="588067539"/>
+      </p:ext>
+    </p:extLst>
+  </p:cSld>
+  <p:clrMapOvr>
+    <a:masterClrMapping/>
+  </p:clrMapOvr>
+</p:sld>
+</file>
+
+<file path=ppt/slides/slide12.xml><?xml version="1.0" encoding="utf-8"?>
+<p:sld xmlns:a="http://schemas.openxmlformats.org/drawingml/2006/main" xmlns:r="http://schemas.openxmlformats.org/officeDocument/2006/relationships" xmlns:p="http://schemas.openxmlformats.org/presentationml/2006/main">
+  <p:cSld>
+    <p:spTree>
+      <p:nvGrpSpPr>
+        <p:cNvPr id="1" name=""/>
+        <p:cNvGrpSpPr/>
+        <p:nvPr/>
+      </p:nvGrpSpPr>
+      <p:grpSpPr>
+        <a:xfrm>
+          <a:off x="0" y="0"/>
+          <a:ext cx="0" cy="0"/>
+          <a:chOff x="0" y="0"/>
+          <a:chExt cx="0" cy="0"/>
+        </a:xfrm>
+      </p:grpSpPr>
+      <p:sp>
+        <p:nvSpPr>
+          <p:cNvPr id="2" name="Inhaltsplatzhalter 1"/>
+          <p:cNvSpPr>
+            <a:spLocks noGrp="1"/>
+          </p:cNvSpPr>
+          <p:nvPr>
+            <p:ph sz="half" idx="1"/>
+          </p:nvPr>
+        </p:nvSpPr>
+        <p:spPr/>
+        <p:txBody>
+          <a:bodyPr/>
+          <a:lstStyle/>
+          <a:p>
+            <a:r>
+              <a:rPr lang="de-CH" dirty="0" smtClean="0"/>
+              <a:t>Scrum1</a:t>
+            </a:r>
+          </a:p>
+          <a:p>
+            <a:endParaRPr lang="de-CH" dirty="0"/>
+          </a:p>
+          <a:p>
+            <a:r>
+              <a:rPr lang="de-CH" dirty="0" smtClean="0"/>
+              <a:t>Scrum2</a:t>
+            </a:r>
+          </a:p>
+          <a:p>
+            <a:endParaRPr lang="de-CH" dirty="0"/>
+          </a:p>
+          <a:p>
+            <a:r>
+              <a:rPr lang="de-CH" dirty="0" smtClean="0"/>
+              <a:t>Scrum3</a:t>
+            </a:r>
+            <a:endParaRPr lang="de-CH" dirty="0"/>
+          </a:p>
+        </p:txBody>
+      </p:sp>
+      <p:sp>
+        <p:nvSpPr>
+          <p:cNvPr id="3" name="Titel 2"/>
+          <p:cNvSpPr>
+            <a:spLocks noGrp="1"/>
+          </p:cNvSpPr>
+          <p:nvPr>
+            <p:ph type="ctrTitle"/>
+          </p:nvPr>
+        </p:nvSpPr>
+        <p:spPr/>
+        <p:txBody>
+          <a:bodyPr/>
+          <a:lstStyle/>
+          <a:p>
+            <a:r>
+              <a:rPr lang="de-CH" dirty="0" err="1" smtClean="0"/>
+              <a:t>Scrum</a:t>
+            </a:r>
+            <a:r>
+              <a:rPr lang="de-CH" dirty="0" smtClean="0"/>
+              <a:t> </a:t>
+            </a:r>
+            <a:r>
+              <a:rPr lang="de-CH" dirty="0" err="1" smtClean="0"/>
+              <a:t>retrospective</a:t>
+            </a:r>
+            <a:endParaRPr lang="de-CH" dirty="0"/>
+          </a:p>
+        </p:txBody>
+      </p:sp>
+    </p:spTree>
+    <p:extLst>
+      <p:ext uri="{BB962C8B-B14F-4D97-AF65-F5344CB8AC3E}">
+        <p14:creationId xmlns:p14="http://schemas.microsoft.com/office/powerpoint/2010/main" val="1121024654"/>
+      </p:ext>
+    </p:extLst>
+  </p:cSld>
+  <p:clrMapOvr>
+    <a:masterClrMapping/>
+  </p:clrMapOvr>
+</p:sld>
+</file>
+
+<file path=ppt/slides/slide13.xml><?xml version="1.0" encoding="utf-8"?>
+<p:sld xmlns:a="http://schemas.openxmlformats.org/drawingml/2006/main" xmlns:r="http://schemas.openxmlformats.org/officeDocument/2006/relationships" xmlns:p="http://schemas.openxmlformats.org/presentationml/2006/main">
+  <p:cSld>
+    <p:spTree>
+      <p:nvGrpSpPr>
+        <p:cNvPr id="1" name=""/>
+        <p:cNvGrpSpPr/>
+        <p:nvPr/>
+      </p:nvGrpSpPr>
+      <p:grpSpPr>
+        <a:xfrm>
+          <a:off x="0" y="0"/>
+          <a:ext cx="0" cy="0"/>
+          <a:chOff x="0" y="0"/>
+          <a:chExt cx="0" cy="0"/>
+        </a:xfrm>
+      </p:grpSpPr>
+      <p:sp>
+        <p:nvSpPr>
+          <p:cNvPr id="2" name="Inhaltsplatzhalter 1"/>
+          <p:cNvSpPr>
+            <a:spLocks noGrp="1"/>
+          </p:cNvSpPr>
+          <p:nvPr>
+            <p:ph sz="half" idx="1"/>
+          </p:nvPr>
+        </p:nvSpPr>
+        <p:spPr/>
+        <p:txBody>
+          <a:bodyPr/>
+          <a:lstStyle/>
+          <a:p>
+            <a:endParaRPr lang="de-CH" dirty="0"/>
+          </a:p>
+        </p:txBody>
+      </p:sp>
+      <p:sp>
+        <p:nvSpPr>
+          <p:cNvPr id="3" name="Titel 2"/>
+          <p:cNvSpPr>
+            <a:spLocks noGrp="1"/>
+          </p:cNvSpPr>
+          <p:nvPr>
+            <p:ph type="ctrTitle"/>
+          </p:nvPr>
+        </p:nvSpPr>
+        <p:spPr/>
+        <p:txBody>
+          <a:bodyPr/>
+          <a:lstStyle/>
+          <a:p>
+            <a:r>
+              <a:rPr lang="de-CH" dirty="0" smtClean="0"/>
+              <a:t>Team</a:t>
+            </a:r>
+            <a:endParaRPr lang="de-CH" dirty="0"/>
+          </a:p>
+        </p:txBody>
+      </p:sp>
+    </p:spTree>
+    <p:extLst>
+      <p:ext uri="{BB962C8B-B14F-4D97-AF65-F5344CB8AC3E}">
+        <p14:creationId xmlns:p14="http://schemas.microsoft.com/office/powerpoint/2010/main" val="2861580105"/>
+      </p:ext>
+    </p:extLst>
+  </p:cSld>
+  <p:clrMapOvr>
+    <a:masterClrMapping/>
+  </p:clrMapOvr>
+</p:sld>
+</file>
+
+<file path=ppt/slides/slide14.xml><?xml version="1.0" encoding="utf-8"?>
+<p:sld xmlns:a="http://schemas.openxmlformats.org/drawingml/2006/main" xmlns:r="http://schemas.openxmlformats.org/officeDocument/2006/relationships" xmlns:p="http://schemas.openxmlformats.org/presentationml/2006/main">
+  <p:cSld>
+    <p:spTree>
+      <p:nvGrpSpPr>
+        <p:cNvPr id="1" name=""/>
+        <p:cNvGrpSpPr/>
+        <p:nvPr/>
+      </p:nvGrpSpPr>
+      <p:grpSpPr>
+        <a:xfrm>
+          <a:off x="0" y="0"/>
+          <a:ext cx="0" cy="0"/>
+          <a:chOff x="0" y="0"/>
+          <a:chExt cx="0" cy="0"/>
+        </a:xfrm>
+      </p:grpSpPr>
+      <p:sp>
+        <p:nvSpPr>
+          <p:cNvPr id="2" name="Titel 1"/>
+          <p:cNvSpPr>
+            <a:spLocks noGrp="1"/>
+          </p:cNvSpPr>
+          <p:nvPr>
+            <p:ph type="ctrTitle"/>
+          </p:nvPr>
+        </p:nvSpPr>
+        <p:spPr/>
+        <p:txBody>
+          <a:bodyPr/>
+          <a:lstStyle/>
+          <a:p>
+            <a:r>
+              <a:rPr lang="de-DE" dirty="0" err="1" smtClean="0"/>
+              <a:t>Thanks</a:t>
+            </a:r>
+            <a:r>
+              <a:rPr lang="de-DE" dirty="0" smtClean="0"/>
+              <a:t>!</a:t>
+            </a:r>
+            <a:endParaRPr lang="de-CH" dirty="0"/>
+          </a:p>
+        </p:txBody>
+      </p:sp>
+    </p:spTree>
+    <p:extLst>
+      <p:ext uri="{BB962C8B-B14F-4D97-AF65-F5344CB8AC3E}">
+        <p14:creationId xmlns:p14="http://schemas.microsoft.com/office/powerpoint/2010/main" val="1252526614"/>
+      </p:ext>
+    </p:extLst>
+  </p:cSld>
+  <p:clrMapOvr>
+    <a:masterClrMapping/>
+  </p:clrMapOvr>
 </p:sld>
 </file>
 
@@ -7050,40 +7532,12 @@
           <a:lstStyle/>
           <a:p>
             <a:r>
-              <a:rPr lang="de-CH" dirty="0" err="1"/>
-              <a:t>Stuff</a:t>
-            </a:r>
-            <a:r>
-              <a:rPr lang="de-CH" dirty="0"/>
-              <a:t> </a:t>
-            </a:r>
-            <a:r>
-              <a:rPr lang="de-CH" dirty="0" err="1"/>
-              <a:t>of</a:t>
-            </a:r>
-            <a:r>
-              <a:rPr lang="de-CH" dirty="0"/>
-              <a:t> </a:t>
-            </a:r>
-            <a:r>
-              <a:rPr lang="de-CH" dirty="0" err="1"/>
-              <a:t>each</a:t>
-            </a:r>
-            <a:r>
-              <a:rPr lang="de-CH" dirty="0"/>
-              <a:t> </a:t>
-            </a:r>
-            <a:r>
-              <a:rPr lang="de-CH" dirty="0" err="1"/>
-              <a:t>team</a:t>
-            </a:r>
-            <a:r>
-              <a:rPr lang="de-CH" dirty="0"/>
-              <a:t> </a:t>
-            </a:r>
-            <a:r>
-              <a:rPr lang="de-CH" dirty="0" err="1"/>
-              <a:t>member</a:t>
+              <a:rPr lang="de-CH" dirty="0" smtClean="0"/>
+              <a:t>Personal </a:t>
+            </a:r>
+            <a:r>
+              <a:rPr lang="de-CH" dirty="0" err="1" smtClean="0"/>
+              <a:t>contribution</a:t>
             </a:r>
             <a:endParaRPr lang="de-CH" dirty="0"/>
           </a:p>
@@ -7140,12 +7594,12 @@
       </p:grpSpPr>
       <p:sp>
         <p:nvSpPr>
-          <p:cNvPr id="2" name="Titel 1"/>
-          <p:cNvSpPr>
-            <a:spLocks noGrp="1"/>
-          </p:cNvSpPr>
-          <p:nvPr>
-            <p:ph type="ctrTitle"/>
+          <p:cNvPr id="2" name="Inhaltsplatzhalter 1"/>
+          <p:cNvSpPr>
+            <a:spLocks noGrp="1"/>
+          </p:cNvSpPr>
+          <p:nvPr>
+            <p:ph sz="half" idx="1"/>
           </p:nvPr>
         </p:nvSpPr>
         <p:spPr/>
@@ -7153,13 +7607,28 @@
           <a:bodyPr/>
           <a:lstStyle/>
           <a:p>
-            <a:r>
-              <a:rPr lang="de-DE" dirty="0" err="1" smtClean="0"/>
-              <a:t>Thanks</a:t>
-            </a:r>
-            <a:r>
-              <a:rPr lang="de-DE" dirty="0" smtClean="0"/>
-              <a:t>!</a:t>
+            <a:endParaRPr lang="de-CH" dirty="0"/>
+          </a:p>
+        </p:txBody>
+      </p:sp>
+      <p:sp>
+        <p:nvSpPr>
+          <p:cNvPr id="3" name="Titel 2"/>
+          <p:cNvSpPr>
+            <a:spLocks noGrp="1"/>
+          </p:cNvSpPr>
+          <p:nvPr>
+            <p:ph type="ctrTitle"/>
+          </p:nvPr>
+        </p:nvSpPr>
+        <p:spPr/>
+        <p:txBody>
+          <a:bodyPr/>
+          <a:lstStyle/>
+          <a:p>
+            <a:r>
+              <a:rPr lang="de-CH" dirty="0" smtClean="0"/>
+              <a:t>Stefan Iseli</a:t>
             </a:r>
             <a:endParaRPr lang="de-CH" dirty="0"/>
           </a:p>
@@ -7168,20 +7637,301 @@
     </p:spTree>
     <p:extLst>
       <p:ext uri="{BB962C8B-B14F-4D97-AF65-F5344CB8AC3E}">
-        <p14:creationId xmlns:p14="http://schemas.microsoft.com/office/powerpoint/2010/main" val="1252526614"/>
+        <p14:creationId xmlns:p14="http://schemas.microsoft.com/office/powerpoint/2010/main" val="3080710229"/>
       </p:ext>
     </p:extLst>
   </p:cSld>
   <p:clrMapOvr>
     <a:masterClrMapping/>
   </p:clrMapOvr>
-  <p:timing>
-    <p:tnLst>
-      <p:par>
-        <p:cTn id="1" dur="indefinite" restart="never" nodeType="tmRoot"/>
-      </p:par>
-    </p:tnLst>
-  </p:timing>
+</p:sld>
+</file>
+
+<file path=ppt/slides/slide6.xml><?xml version="1.0" encoding="utf-8"?>
+<p:sld xmlns:a="http://schemas.openxmlformats.org/drawingml/2006/main" xmlns:r="http://schemas.openxmlformats.org/officeDocument/2006/relationships" xmlns:p="http://schemas.openxmlformats.org/presentationml/2006/main">
+  <p:cSld>
+    <p:spTree>
+      <p:nvGrpSpPr>
+        <p:cNvPr id="1" name=""/>
+        <p:cNvGrpSpPr/>
+        <p:nvPr/>
+      </p:nvGrpSpPr>
+      <p:grpSpPr>
+        <a:xfrm>
+          <a:off x="0" y="0"/>
+          <a:ext cx="0" cy="0"/>
+          <a:chOff x="0" y="0"/>
+          <a:chExt cx="0" cy="0"/>
+        </a:xfrm>
+      </p:grpSpPr>
+      <p:sp>
+        <p:nvSpPr>
+          <p:cNvPr id="2" name="Inhaltsplatzhalter 1"/>
+          <p:cNvSpPr>
+            <a:spLocks noGrp="1"/>
+          </p:cNvSpPr>
+          <p:nvPr>
+            <p:ph sz="half" idx="1"/>
+          </p:nvPr>
+        </p:nvSpPr>
+        <p:spPr/>
+        <p:txBody>
+          <a:bodyPr/>
+          <a:lstStyle/>
+          <a:p>
+            <a:endParaRPr lang="de-CH" dirty="0"/>
+          </a:p>
+        </p:txBody>
+      </p:sp>
+      <p:sp>
+        <p:nvSpPr>
+          <p:cNvPr id="3" name="Titel 2"/>
+          <p:cNvSpPr>
+            <a:spLocks noGrp="1"/>
+          </p:cNvSpPr>
+          <p:nvPr>
+            <p:ph type="ctrTitle"/>
+          </p:nvPr>
+        </p:nvSpPr>
+        <p:spPr/>
+        <p:txBody>
+          <a:bodyPr/>
+          <a:lstStyle/>
+          <a:p>
+            <a:r>
+              <a:rPr lang="de-CH" dirty="0" smtClean="0"/>
+              <a:t>Tim Dorner</a:t>
+            </a:r>
+            <a:endParaRPr lang="de-CH" dirty="0"/>
+          </a:p>
+        </p:txBody>
+      </p:sp>
+    </p:spTree>
+    <p:extLst>
+      <p:ext uri="{BB962C8B-B14F-4D97-AF65-F5344CB8AC3E}">
+        <p14:creationId xmlns:p14="http://schemas.microsoft.com/office/powerpoint/2010/main" val="3233346993"/>
+      </p:ext>
+    </p:extLst>
+  </p:cSld>
+  <p:clrMapOvr>
+    <a:masterClrMapping/>
+  </p:clrMapOvr>
+</p:sld>
+</file>
+
+<file path=ppt/slides/slide7.xml><?xml version="1.0" encoding="utf-8"?>
+<p:sld xmlns:a="http://schemas.openxmlformats.org/drawingml/2006/main" xmlns:r="http://schemas.openxmlformats.org/officeDocument/2006/relationships" xmlns:p="http://schemas.openxmlformats.org/presentationml/2006/main">
+  <p:cSld>
+    <p:spTree>
+      <p:nvGrpSpPr>
+        <p:cNvPr id="1" name=""/>
+        <p:cNvGrpSpPr/>
+        <p:nvPr/>
+      </p:nvGrpSpPr>
+      <p:grpSpPr>
+        <a:xfrm>
+          <a:off x="0" y="0"/>
+          <a:ext cx="0" cy="0"/>
+          <a:chOff x="0" y="0"/>
+          <a:chExt cx="0" cy="0"/>
+        </a:xfrm>
+      </p:grpSpPr>
+      <p:sp>
+        <p:nvSpPr>
+          <p:cNvPr id="2" name="Inhaltsplatzhalter 1"/>
+          <p:cNvSpPr>
+            <a:spLocks noGrp="1"/>
+          </p:cNvSpPr>
+          <p:nvPr>
+            <p:ph sz="half" idx="1"/>
+          </p:nvPr>
+        </p:nvSpPr>
+        <p:spPr/>
+        <p:txBody>
+          <a:bodyPr/>
+          <a:lstStyle/>
+          <a:p>
+            <a:endParaRPr lang="de-CH" dirty="0"/>
+          </a:p>
+        </p:txBody>
+      </p:sp>
+      <p:sp>
+        <p:nvSpPr>
+          <p:cNvPr id="3" name="Titel 2"/>
+          <p:cNvSpPr>
+            <a:spLocks noGrp="1"/>
+          </p:cNvSpPr>
+          <p:nvPr>
+            <p:ph type="ctrTitle"/>
+          </p:nvPr>
+        </p:nvSpPr>
+        <p:spPr/>
+        <p:txBody>
+          <a:bodyPr/>
+          <a:lstStyle/>
+          <a:p>
+            <a:r>
+              <a:rPr lang="de-CH" dirty="0" smtClean="0"/>
+              <a:t>Lukas Hügi</a:t>
+            </a:r>
+            <a:endParaRPr lang="de-CH" dirty="0"/>
+          </a:p>
+        </p:txBody>
+      </p:sp>
+    </p:spTree>
+    <p:extLst>
+      <p:ext uri="{BB962C8B-B14F-4D97-AF65-F5344CB8AC3E}">
+        <p14:creationId xmlns:p14="http://schemas.microsoft.com/office/powerpoint/2010/main" val="1496770157"/>
+      </p:ext>
+    </p:extLst>
+  </p:cSld>
+  <p:clrMapOvr>
+    <a:masterClrMapping/>
+  </p:clrMapOvr>
+</p:sld>
+</file>
+
+<file path=ppt/slides/slide8.xml><?xml version="1.0" encoding="utf-8"?>
+<p:sld xmlns:a="http://schemas.openxmlformats.org/drawingml/2006/main" xmlns:r="http://schemas.openxmlformats.org/officeDocument/2006/relationships" xmlns:p="http://schemas.openxmlformats.org/presentationml/2006/main">
+  <p:cSld>
+    <p:spTree>
+      <p:nvGrpSpPr>
+        <p:cNvPr id="1" name=""/>
+        <p:cNvGrpSpPr/>
+        <p:nvPr/>
+      </p:nvGrpSpPr>
+      <p:grpSpPr>
+        <a:xfrm>
+          <a:off x="0" y="0"/>
+          <a:ext cx="0" cy="0"/>
+          <a:chOff x="0" y="0"/>
+          <a:chExt cx="0" cy="0"/>
+        </a:xfrm>
+      </p:grpSpPr>
+      <p:sp>
+        <p:nvSpPr>
+          <p:cNvPr id="2" name="Inhaltsplatzhalter 1"/>
+          <p:cNvSpPr>
+            <a:spLocks noGrp="1"/>
+          </p:cNvSpPr>
+          <p:nvPr>
+            <p:ph sz="half" idx="1"/>
+          </p:nvPr>
+        </p:nvSpPr>
+        <p:spPr/>
+        <p:txBody>
+          <a:bodyPr/>
+          <a:lstStyle/>
+          <a:p>
+            <a:endParaRPr lang="de-CH" dirty="0"/>
+          </a:p>
+        </p:txBody>
+      </p:sp>
+      <p:sp>
+        <p:nvSpPr>
+          <p:cNvPr id="3" name="Titel 2"/>
+          <p:cNvSpPr>
+            <a:spLocks noGrp="1"/>
+          </p:cNvSpPr>
+          <p:nvPr>
+            <p:ph type="ctrTitle"/>
+          </p:nvPr>
+        </p:nvSpPr>
+        <p:spPr/>
+        <p:txBody>
+          <a:bodyPr/>
+          <a:lstStyle/>
+          <a:p>
+            <a:r>
+              <a:rPr lang="de-CH" dirty="0" smtClean="0"/>
+              <a:t>Fabian Zwahlen</a:t>
+            </a:r>
+            <a:endParaRPr lang="de-CH" dirty="0"/>
+          </a:p>
+        </p:txBody>
+      </p:sp>
+    </p:spTree>
+    <p:extLst>
+      <p:ext uri="{BB962C8B-B14F-4D97-AF65-F5344CB8AC3E}">
+        <p14:creationId xmlns:p14="http://schemas.microsoft.com/office/powerpoint/2010/main" val="1846725204"/>
+      </p:ext>
+    </p:extLst>
+  </p:cSld>
+  <p:clrMapOvr>
+    <a:masterClrMapping/>
+  </p:clrMapOvr>
+</p:sld>
+</file>
+
+<file path=ppt/slides/slide9.xml><?xml version="1.0" encoding="utf-8"?>
+<p:sld xmlns:a="http://schemas.openxmlformats.org/drawingml/2006/main" xmlns:r="http://schemas.openxmlformats.org/officeDocument/2006/relationships" xmlns:p="http://schemas.openxmlformats.org/presentationml/2006/main">
+  <p:cSld>
+    <p:spTree>
+      <p:nvGrpSpPr>
+        <p:cNvPr id="1" name=""/>
+        <p:cNvGrpSpPr/>
+        <p:nvPr/>
+      </p:nvGrpSpPr>
+      <p:grpSpPr>
+        <a:xfrm>
+          <a:off x="0" y="0"/>
+          <a:ext cx="0" cy="0"/>
+          <a:chOff x="0" y="0"/>
+          <a:chExt cx="0" cy="0"/>
+        </a:xfrm>
+      </p:grpSpPr>
+      <p:sp>
+        <p:nvSpPr>
+          <p:cNvPr id="2" name="Inhaltsplatzhalter 1"/>
+          <p:cNvSpPr>
+            <a:spLocks noGrp="1"/>
+          </p:cNvSpPr>
+          <p:nvPr>
+            <p:ph sz="half" idx="1"/>
+          </p:nvPr>
+        </p:nvSpPr>
+        <p:spPr/>
+        <p:txBody>
+          <a:bodyPr/>
+          <a:lstStyle/>
+          <a:p>
+            <a:endParaRPr lang="de-CH" dirty="0"/>
+          </a:p>
+        </p:txBody>
+      </p:sp>
+      <p:sp>
+        <p:nvSpPr>
+          <p:cNvPr id="3" name="Titel 2"/>
+          <p:cNvSpPr>
+            <a:spLocks noGrp="1"/>
+          </p:cNvSpPr>
+          <p:nvPr>
+            <p:ph type="ctrTitle"/>
+          </p:nvPr>
+        </p:nvSpPr>
+        <p:spPr/>
+        <p:txBody>
+          <a:bodyPr/>
+          <a:lstStyle/>
+          <a:p>
+            <a:r>
+              <a:rPr lang="de-CH" dirty="0" smtClean="0"/>
+              <a:t>Christine Noser</a:t>
+            </a:r>
+            <a:endParaRPr lang="de-CH" dirty="0"/>
+          </a:p>
+        </p:txBody>
+      </p:sp>
+    </p:spTree>
+    <p:extLst>
+      <p:ext uri="{BB962C8B-B14F-4D97-AF65-F5344CB8AC3E}">
+        <p14:creationId xmlns:p14="http://schemas.microsoft.com/office/powerpoint/2010/main" val="4274507909"/>
+      </p:ext>
+    </p:extLst>
+  </p:cSld>
+  <p:clrMapOvr>
+    <a:masterClrMapping/>
+  </p:clrMapOvr>
 </p:sld>
 </file>
 
@@ -8016,6 +8766,23 @@
 </file>
 
 <file path=customXml/item1.xml><?xml version="1.0" encoding="utf-8"?>
+<?mso-contentType ?>
+<FormTemplates xmlns="http://schemas.microsoft.com/sharepoint/v3/contenttype/forms">
+  <Display>DocumentLibraryForm</Display>
+  <Edit>DocumentLibraryForm</Edit>
+  <New>DocumentLibraryForm</New>
+</FormTemplates>
+</file>
+
+<file path=customXml/item2.xml><?xml version="1.0" encoding="utf-8"?>
+<p:properties xmlns:p="http://schemas.microsoft.com/office/2006/metadata/properties" xmlns:xsi="http://www.w3.org/2001/XMLSchema-instance">
+  <documentManagement>
+    <AVMTitle xmlns="5091c847-84be-4f4f-b16c-c018ad2ca66b">Präsentation BFH_2013</AVMTitle>
+  </documentManagement>
+</p:properties>
+</file>
+
+<file path=customXml/item3.xml><?xml version="1.0" encoding="utf-8"?>
 <ct:contentTypeSchema xmlns:ct="http://schemas.microsoft.com/office/2006/metadata/contentType" xmlns:ma="http://schemas.microsoft.com/office/2006/metadata/properties/metaAttributes" ct:_="" ma:_="" ma:contentTypeName="Dokument" ma:contentTypeID="0x010100EBE3A9EFF36793468C03E2811ACE2A2B" ma:contentTypeVersion="1" ma:contentTypeDescription="Ein neues Dokument erstellen." ma:contentTypeScope="" ma:versionID="e65be32cb1bfff77fc8c9c09bf542651">
   <xsd:schema xmlns:xsd="http://www.w3.org/2001/XMLSchema" xmlns:p="http://schemas.microsoft.com/office/2006/metadata/properties" xmlns:ns2="5091c847-84be-4f4f-b16c-c018ad2ca66b" targetNamespace="http://schemas.microsoft.com/office/2006/metadata/properties" ma:root="true" ma:fieldsID="7636c84aed5b7d09a166fcef888725d4" ns2:_="">
     <xsd:import namespace="5091c847-84be-4f4f-b16c-c018ad2ca66b"/>
@@ -8075,36 +8842,10 @@
 </ct:contentTypeSchema>
 </file>
 
-<file path=customXml/item2.xml><?xml version="1.0" encoding="utf-8"?>
-<p:properties xmlns:p="http://schemas.microsoft.com/office/2006/metadata/properties" xmlns:xsi="http://www.w3.org/2001/XMLSchema-instance">
-  <documentManagement>
-    <AVMTitle xmlns="5091c847-84be-4f4f-b16c-c018ad2ca66b">Präsentation BFH_2013</AVMTitle>
-  </documentManagement>
-</p:properties>
-</file>
-
-<file path=customXml/item3.xml><?xml version="1.0" encoding="utf-8"?>
-<?mso-contentType ?>
-<FormTemplates xmlns="http://schemas.microsoft.com/sharepoint/v3/contenttype/forms">
-  <Display>DocumentLibraryForm</Display>
-  <Edit>DocumentLibraryForm</Edit>
-  <New>DocumentLibraryForm</New>
-</FormTemplates>
-</file>
-
 <file path=customXml/itemProps1.xml><?xml version="1.0" encoding="utf-8"?>
-<ds:datastoreItem xmlns:ds="http://schemas.openxmlformats.org/officeDocument/2006/customXml" ds:itemID="{15287BEA-F3FF-4B87-929B-5D0092183197}">
+<ds:datastoreItem xmlns:ds="http://schemas.openxmlformats.org/officeDocument/2006/customXml" ds:itemID="{1851D33F-E468-417B-A30C-509B68D2BD09}">
   <ds:schemaRefs>
-    <ds:schemaRef ds:uri="http://schemas.microsoft.com/office/2006/metadata/contentType"/>
-    <ds:schemaRef ds:uri="http://schemas.microsoft.com/office/2006/metadata/properties/metaAttributes"/>
-    <ds:schemaRef ds:uri="http://www.w3.org/2001/XMLSchema"/>
-    <ds:schemaRef ds:uri="http://schemas.microsoft.com/office/2006/metadata/properties"/>
-    <ds:schemaRef ds:uri="5091c847-84be-4f4f-b16c-c018ad2ca66b"/>
-    <ds:schemaRef ds:uri="http://schemas.microsoft.com/office/2006/documentManagement/types"/>
-    <ds:schemaRef ds:uri="http://schemas.openxmlformats.org/package/2006/metadata/core-properties"/>
-    <ds:schemaRef ds:uri="http://purl.org/dc/elements/1.1/"/>
-    <ds:schemaRef ds:uri="http://purl.org/dc/terms/"/>
-    <ds:schemaRef ds:uri="http://schemas.microsoft.com/office/internal/2005/internalDocumentation"/>
+    <ds:schemaRef ds:uri="http://schemas.microsoft.com/sharepoint/v3/contenttype/forms"/>
   </ds:schemaRefs>
 </ds:datastoreItem>
 </file>
@@ -8125,9 +8866,18 @@
 </file>
 
 <file path=customXml/itemProps3.xml><?xml version="1.0" encoding="utf-8"?>
-<ds:datastoreItem xmlns:ds="http://schemas.openxmlformats.org/officeDocument/2006/customXml" ds:itemID="{1851D33F-E468-417B-A30C-509B68D2BD09}">
+<ds:datastoreItem xmlns:ds="http://schemas.openxmlformats.org/officeDocument/2006/customXml" ds:itemID="{15287BEA-F3FF-4B87-929B-5D0092183197}">
   <ds:schemaRefs>
-    <ds:schemaRef ds:uri="http://schemas.microsoft.com/sharepoint/v3/contenttype/forms"/>
+    <ds:schemaRef ds:uri="http://schemas.microsoft.com/office/2006/metadata/contentType"/>
+    <ds:schemaRef ds:uri="http://schemas.microsoft.com/office/2006/metadata/properties/metaAttributes"/>
+    <ds:schemaRef ds:uri="http://www.w3.org/2001/XMLSchema"/>
+    <ds:schemaRef ds:uri="http://schemas.microsoft.com/office/2006/metadata/properties"/>
+    <ds:schemaRef ds:uri="5091c847-84be-4f4f-b16c-c018ad2ca66b"/>
+    <ds:schemaRef ds:uri="http://schemas.microsoft.com/office/2006/documentManagement/types"/>
+    <ds:schemaRef ds:uri="http://schemas.openxmlformats.org/package/2006/metadata/core-properties"/>
+    <ds:schemaRef ds:uri="http://purl.org/dc/elements/1.1/"/>
+    <ds:schemaRef ds:uri="http://purl.org/dc/terms/"/>
+    <ds:schemaRef ds:uri="http://schemas.microsoft.com/office/internal/2005/internalDocumentation"/>
   </ds:schemaRefs>
 </ds:datastoreItem>
 </file>
</xml_diff>

<commit_message>
added srum master review
</commit_message>
<xml_diff>
--- a/doc/task14/Task14.pptx
+++ b/doc/task14/Task14.pptx
@@ -7013,8 +7013,25 @@
           <a:p>
             <a:r>
               <a:rPr lang="de-CH" dirty="0" smtClean="0"/>
-              <a:t>Zu wenig Informationen</a:t>
-            </a:r>
+              <a:t>Zu wenig </a:t>
+            </a:r>
+            <a:r>
+              <a:rPr lang="de-CH" dirty="0" smtClean="0"/>
+              <a:t>Informationen </a:t>
+            </a:r>
+            <a:r>
+              <a:rPr lang="de-CH" dirty="0" smtClean="0">
+                <a:sym typeface="Wingdings" panose="05000000000000000000" pitchFamily="2" charset="2"/>
+              </a:rPr>
+              <a:t> Mehr </a:t>
+            </a:r>
+            <a:r>
+              <a:rPr lang="de-CH" dirty="0" err="1" smtClean="0">
+                <a:sym typeface="Wingdings" panose="05000000000000000000" pitchFamily="2" charset="2"/>
+              </a:rPr>
+              <a:t>einhohlen</a:t>
+            </a:r>
+            <a:endParaRPr lang="de-CH" dirty="0" smtClean="0"/>
           </a:p>
           <a:p>
             <a:r>
@@ -7025,7 +7042,11 @@
           <a:p>
             <a:r>
               <a:rPr lang="de-CH" dirty="0" smtClean="0"/>
-              <a:t>Wurden zu wenig berücksichtigt</a:t>
+              <a:t>Wurden in folge </a:t>
+            </a:r>
+            <a:r>
+              <a:rPr lang="de-CH" dirty="0" smtClean="0"/>
+              <a:t>zu wenig berücksichtigt</a:t>
             </a:r>
           </a:p>
           <a:p>
@@ -7033,7 +7054,6 @@
               <a:rPr lang="de-CH" dirty="0" smtClean="0"/>
               <a:t>Fantasievoller</a:t>
             </a:r>
-            <a:endParaRPr lang="de-CH" dirty="0" smtClean="0"/>
           </a:p>
           <a:p>
             <a:endParaRPr lang="de-CH" dirty="0" smtClean="0"/>
@@ -7255,7 +7275,6 @@
               <a:rPr lang="de-CH" dirty="0" smtClean="0"/>
               <a:t>Evaluation durch Leien und Fachpersonen</a:t>
             </a:r>
-            <a:endParaRPr lang="de-CH" dirty="0" smtClean="0"/>
           </a:p>
         </p:txBody>
       </p:sp>
@@ -7455,45 +7474,113 @@
             <a:pPr lvl="1"/>
             <a:r>
               <a:rPr lang="de-CH" dirty="0" smtClean="0"/>
-              <a:t>Daily Scrum nur Mi &amp; Do </a:t>
-            </a:r>
-            <a:r>
-              <a:rPr lang="de-CH" dirty="0" smtClean="0">
-                <a:sym typeface="Wingdings" panose="05000000000000000000" pitchFamily="2" charset="2"/>
-              </a:rPr>
-              <a:t></a:t>
+              <a:t>Daily </a:t>
+            </a:r>
+            <a:r>
+              <a:rPr lang="de-CH" dirty="0" err="1" smtClean="0"/>
+              <a:t>Scrum</a:t>
             </a:r>
             <a:r>
               <a:rPr lang="de-CH" dirty="0" smtClean="0"/>
-              <a:t> keinen Sinn</a:t>
+              <a:t> </a:t>
+            </a:r>
+            <a:r>
+              <a:rPr lang="de-CH" dirty="0" smtClean="0"/>
+              <a:t>nur Mo, </a:t>
+            </a:r>
+            <a:r>
+              <a:rPr lang="de-CH" dirty="0" smtClean="0"/>
+              <a:t>Mi &amp; </a:t>
+            </a:r>
+            <a:r>
+              <a:rPr lang="de-CH" dirty="0" smtClean="0"/>
+              <a:t>Do</a:t>
             </a:r>
           </a:p>
           <a:p>
             <a:pPr lvl="1"/>
             <a:r>
               <a:rPr lang="de-CH" dirty="0" smtClean="0"/>
-              <a:t>Klarere Aufteilung</a:t>
+              <a:t>Klarere </a:t>
+            </a:r>
+            <a:r>
+              <a:rPr lang="de-CH" dirty="0" smtClean="0"/>
+              <a:t>Aufteilung</a:t>
             </a:r>
           </a:p>
           <a:p>
             <a:pPr lvl="1"/>
             <a:r>
               <a:rPr lang="de-CH" dirty="0" smtClean="0"/>
-              <a:t>Daily Scrum Time Boxing!!!</a:t>
-            </a:r>
+              <a:t>Daily Scrum Time </a:t>
+            </a:r>
+            <a:r>
+              <a:rPr lang="de-CH" dirty="0" err="1" smtClean="0"/>
+              <a:t>Boxing</a:t>
+            </a:r>
+            <a:r>
+              <a:rPr lang="de-CH" dirty="0" smtClean="0"/>
+              <a:t>!</a:t>
+            </a:r>
+            <a:endParaRPr lang="de-CH" dirty="0" smtClean="0"/>
           </a:p>
           <a:p>
             <a:pPr lvl="1"/>
             <a:r>
-              <a:rPr lang="de-CH" smtClean="0"/>
-              <a:t>Manchmal bla bla bla</a:t>
+              <a:rPr lang="de-CH" dirty="0" smtClean="0"/>
+              <a:t>Manchmal </a:t>
+            </a:r>
+            <a:r>
+              <a:rPr lang="de-CH" dirty="0" smtClean="0"/>
+              <a:t>zu viel sonstiges besprochen</a:t>
+            </a:r>
+          </a:p>
+          <a:p>
+            <a:pPr lvl="2"/>
+            <a:r>
+              <a:rPr lang="de-CH" dirty="0" smtClean="0"/>
+              <a:t>Wirklich nur «was gemacht», «was als nächstes»</a:t>
             </a:r>
             <a:endParaRPr lang="de-CH" dirty="0"/>
           </a:p>
           <a:p>
             <a:r>
+              <a:rPr lang="de-CH" dirty="0" err="1" smtClean="0"/>
+              <a:t>Scrum</a:t>
+            </a:r>
+            <a:r>
               <a:rPr lang="de-CH" dirty="0" smtClean="0"/>
-              <a:t>Scrum Master</a:t>
+              <a:t> </a:t>
+            </a:r>
+            <a:r>
+              <a:rPr lang="de-CH" dirty="0" smtClean="0"/>
+              <a:t>Master</a:t>
+            </a:r>
+          </a:p>
+          <a:p>
+            <a:pPr lvl="1"/>
+            <a:r>
+              <a:rPr lang="de-CH" dirty="0" smtClean="0"/>
+              <a:t>Sprint </a:t>
+            </a:r>
+            <a:r>
+              <a:rPr lang="de-CH" dirty="0" err="1" smtClean="0"/>
+              <a:t>Planning</a:t>
+            </a:r>
+            <a:endParaRPr lang="de-CH" dirty="0" smtClean="0"/>
+          </a:p>
+          <a:p>
+            <a:pPr lvl="2"/>
+            <a:r>
+              <a:rPr lang="de-CH" dirty="0" smtClean="0"/>
+              <a:t>Aufwandsschätzung</a:t>
+            </a:r>
+          </a:p>
+          <a:p>
+            <a:pPr lvl="1"/>
+            <a:r>
+              <a:rPr lang="de-CH" dirty="0" smtClean="0"/>
+              <a:t>Selbständiger</a:t>
             </a:r>
             <a:endParaRPr lang="de-CH" dirty="0"/>
           </a:p>
@@ -7607,11 +7694,7 @@
           <a:p>
             <a:r>
               <a:rPr lang="de-CH" dirty="0" smtClean="0"/>
-              <a:t>Fabian </a:t>
-            </a:r>
-            <a:r>
-              <a:rPr lang="de-CH" dirty="0" smtClean="0"/>
-              <a:t>Zwahlen</a:t>
+              <a:t>Fabian Zwahlen</a:t>
             </a:r>
           </a:p>
           <a:p>
@@ -7643,7 +7726,19 @@
           <a:p>
             <a:r>
               <a:rPr lang="de-CH" dirty="0" smtClean="0"/>
-              <a:t>Team</a:t>
+              <a:t>Team </a:t>
+            </a:r>
+            <a:r>
+              <a:rPr lang="de-CH" dirty="0" err="1" smtClean="0"/>
+              <a:t>Lessons</a:t>
+            </a:r>
+            <a:r>
+              <a:rPr lang="de-CH" dirty="0" smtClean="0"/>
+              <a:t> </a:t>
+            </a:r>
+            <a:r>
+              <a:rPr lang="de-CH" dirty="0" err="1" smtClean="0"/>
+              <a:t>learned</a:t>
             </a:r>
             <a:endParaRPr lang="de-CH" dirty="0"/>
           </a:p>
@@ -9162,11 +9257,12 @@
 </file>
 
 <file path=customXml/item1.xml><?xml version="1.0" encoding="utf-8"?>
-<p:properties xmlns:p="http://schemas.microsoft.com/office/2006/metadata/properties" xmlns:xsi="http://www.w3.org/2001/XMLSchema-instance">
-  <documentManagement>
-    <AVMTitle xmlns="5091c847-84be-4f4f-b16c-c018ad2ca66b">Präsentation BFH_2013</AVMTitle>
-  </documentManagement>
-</p:properties>
+<?mso-contentType ?>
+<FormTemplates xmlns="http://schemas.microsoft.com/sharepoint/v3/contenttype/forms">
+  <Display>DocumentLibraryForm</Display>
+  <Edit>DocumentLibraryForm</Edit>
+  <New>DocumentLibraryForm</New>
+</FormTemplates>
 </file>
 
 <file path=customXml/item2.xml><?xml version="1.0" encoding="utf-8"?>
@@ -9230,25 +9326,17 @@
 </file>
 
 <file path=customXml/item3.xml><?xml version="1.0" encoding="utf-8"?>
-<?mso-contentType ?>
-<FormTemplates xmlns="http://schemas.microsoft.com/sharepoint/v3/contenttype/forms">
-  <Display>DocumentLibraryForm</Display>
-  <Edit>DocumentLibraryForm</Edit>
-  <New>DocumentLibraryForm</New>
-</FormTemplates>
+<p:properties xmlns:p="http://schemas.microsoft.com/office/2006/metadata/properties" xmlns:xsi="http://www.w3.org/2001/XMLSchema-instance">
+  <documentManagement>
+    <AVMTitle xmlns="5091c847-84be-4f4f-b16c-c018ad2ca66b">Präsentation BFH_2013</AVMTitle>
+  </documentManagement>
+</p:properties>
 </file>
 
 <file path=customXml/itemProps1.xml><?xml version="1.0" encoding="utf-8"?>
-<ds:datastoreItem xmlns:ds="http://schemas.openxmlformats.org/officeDocument/2006/customXml" ds:itemID="{32991507-CB83-4F49-BAFB-D322B1D04098}">
+<ds:datastoreItem xmlns:ds="http://schemas.openxmlformats.org/officeDocument/2006/customXml" ds:itemID="{1851D33F-E468-417B-A30C-509B68D2BD09}">
   <ds:schemaRefs>
-    <ds:schemaRef ds:uri="http://purl.org/dc/terms/"/>
-    <ds:schemaRef ds:uri="http://schemas.openxmlformats.org/package/2006/metadata/core-properties"/>
-    <ds:schemaRef ds:uri="http://schemas.microsoft.com/office/2006/documentManagement/types"/>
-    <ds:schemaRef ds:uri="5091c847-84be-4f4f-b16c-c018ad2ca66b"/>
-    <ds:schemaRef ds:uri="http://purl.org/dc/elements/1.1/"/>
-    <ds:schemaRef ds:uri="http://schemas.microsoft.com/office/2006/metadata/properties"/>
-    <ds:schemaRef ds:uri="http://www.w3.org/XML/1998/namespace"/>
-    <ds:schemaRef ds:uri="http://purl.org/dc/dcmitype/"/>
+    <ds:schemaRef ds:uri="http://schemas.microsoft.com/sharepoint/v3/contenttype/forms"/>
   </ds:schemaRefs>
 </ds:datastoreItem>
 </file>
@@ -9271,9 +9359,16 @@
 </file>
 
 <file path=customXml/itemProps3.xml><?xml version="1.0" encoding="utf-8"?>
-<ds:datastoreItem xmlns:ds="http://schemas.openxmlformats.org/officeDocument/2006/customXml" ds:itemID="{1851D33F-E468-417B-A30C-509B68D2BD09}">
+<ds:datastoreItem xmlns:ds="http://schemas.openxmlformats.org/officeDocument/2006/customXml" ds:itemID="{32991507-CB83-4F49-BAFB-D322B1D04098}">
   <ds:schemaRefs>
-    <ds:schemaRef ds:uri="http://schemas.microsoft.com/sharepoint/v3/contenttype/forms"/>
+    <ds:schemaRef ds:uri="http://purl.org/dc/terms/"/>
+    <ds:schemaRef ds:uri="http://schemas.openxmlformats.org/package/2006/metadata/core-properties"/>
+    <ds:schemaRef ds:uri="http://schemas.microsoft.com/office/2006/documentManagement/types"/>
+    <ds:schemaRef ds:uri="5091c847-84be-4f4f-b16c-c018ad2ca66b"/>
+    <ds:schemaRef ds:uri="http://purl.org/dc/elements/1.1/"/>
+    <ds:schemaRef ds:uri="http://schemas.microsoft.com/office/2006/metadata/properties"/>
+    <ds:schemaRef ds:uri="http://www.w3.org/XML/1998/namespace"/>
+    <ds:schemaRef ds:uri="http://purl.org/dc/dcmitype/"/>
   </ds:schemaRefs>
 </ds:datastoreItem>
 </file>
</xml_diff>

<commit_message>
added my contribution and lessons learned
</commit_message>
<xml_diff>
--- a/doc/task14/Task14.pptx
+++ b/doc/task14/Task14.pptx
@@ -271,7 +271,7 @@
           <a:p>
             <a:fld id="{EFA0D184-D464-48E9-9CA0-A94E873F6C2C}" type="datetimeFigureOut">
               <a:rPr lang="de-CH" smtClean="0"/>
-              <a:t>tt.01.jjjj</a:t>
+              <a:t>21.01.2016</a:t>
             </a:fld>
             <a:endParaRPr lang="de-CH"/>
           </a:p>
@@ -337,7 +337,7 @@
           <a:p>
             <a:fld id="{5F377753-DB7C-4FA7-98FC-17681D88797A}" type="slidenum">
               <a:rPr lang="de-CH" smtClean="0"/>
-              <a:t>‹Nr.›</a:t>
+              <a:t>‹#›</a:t>
             </a:fld>
             <a:endParaRPr lang="de-CH"/>
           </a:p>
@@ -436,7 +436,7 @@
           <a:p>
             <a:fld id="{5AF2B663-2BA9-4D7E-8201-5DE4109E1EDD}" type="datetimeFigureOut">
               <a:rPr lang="de-CH" smtClean="0"/>
-              <a:t>tt.01.jjjj</a:t>
+              <a:t>21.01.2016</a:t>
             </a:fld>
             <a:endParaRPr lang="de-CH"/>
           </a:p>
@@ -595,7 +595,7 @@
           <a:p>
             <a:fld id="{37E44704-8E6D-4CF2-8CFA-A0F7BC751896}" type="slidenum">
               <a:rPr lang="de-CH" smtClean="0"/>
-              <a:t>‹Nr.›</a:t>
+              <a:t>‹#›</a:t>
             </a:fld>
             <a:endParaRPr lang="de-CH"/>
           </a:p>
@@ -2214,7 +2214,7 @@
           <a:p>
             <a:fld id="{F19AE9A8-34D4-4E8C-BE9C-13C550F1BED0}" type="slidenum">
               <a:rPr lang="de-CH" smtClean="0"/>
-              <a:t>‹Nr.›</a:t>
+              <a:t>‹#›</a:t>
             </a:fld>
             <a:endParaRPr lang="de-CH" dirty="0"/>
           </a:p>
@@ -2267,7 +2267,7 @@
           <a:p>
             <a:fld id="{F19AE9A8-34D4-4E8C-BE9C-13C550F1BED0}" type="slidenum">
               <a:rPr lang="de-CH" smtClean="0"/>
-              <a:t>‹Nr.›</a:t>
+              <a:t>‹#›</a:t>
             </a:fld>
             <a:endParaRPr lang="de-CH" dirty="0"/>
           </a:p>
@@ -3298,7 +3298,7 @@
           <a:p>
             <a:fld id="{F19AE9A8-34D4-4E8C-BE9C-13C550F1BED0}" type="slidenum">
               <a:rPr lang="de-CH" smtClean="0"/>
-              <a:t>‹Nr.›</a:t>
+              <a:t>‹#›</a:t>
             </a:fld>
             <a:endParaRPr lang="de-CH" dirty="0"/>
           </a:p>
@@ -3687,7 +3687,7 @@
           <a:p>
             <a:fld id="{F19AE9A8-34D4-4E8C-BE9C-13C550F1BED0}" type="slidenum">
               <a:rPr lang="de-CH" smtClean="0"/>
-              <a:t>‹Nr.›</a:t>
+              <a:t>‹#›</a:t>
             </a:fld>
             <a:endParaRPr lang="de-CH" dirty="0"/>
           </a:p>
@@ -3914,7 +3914,7 @@
           <a:p>
             <a:fld id="{F19AE9A8-34D4-4E8C-BE9C-13C550F1BED0}" type="slidenum">
               <a:rPr lang="de-CH" smtClean="0"/>
-              <a:t>‹Nr.›</a:t>
+              <a:t>‹#›</a:t>
             </a:fld>
             <a:endParaRPr lang="de-CH" dirty="0"/>
           </a:p>
@@ -4215,7 +4215,7 @@
           <a:p>
             <a:fld id="{F19AE9A8-34D4-4E8C-BE9C-13C550F1BED0}" type="slidenum">
               <a:rPr lang="de-CH" smtClean="0"/>
-              <a:t>‹Nr.›</a:t>
+              <a:t>‹#›</a:t>
             </a:fld>
             <a:endParaRPr lang="de-CH" dirty="0"/>
           </a:p>
@@ -4738,7 +4738,7 @@
           <a:p>
             <a:fld id="{F19AE9A8-34D4-4E8C-BE9C-13C550F1BED0}" type="slidenum">
               <a:rPr lang="de-CH" smtClean="0"/>
-              <a:t>‹Nr.›</a:t>
+              <a:t>‹#›</a:t>
             </a:fld>
             <a:endParaRPr lang="de-CH" dirty="0"/>
           </a:p>
@@ -5261,7 +5261,7 @@
           <a:p>
             <a:fld id="{F19AE9A8-34D4-4E8C-BE9C-13C550F1BED0}" type="slidenum">
               <a:rPr lang="de-CH" smtClean="0"/>
-              <a:t>‹Nr.›</a:t>
+              <a:t>‹#›</a:t>
             </a:fld>
             <a:endParaRPr lang="de-CH" dirty="0"/>
           </a:p>
@@ -5988,7 +5988,7 @@
             <a:fld id="{F19AE9A8-34D4-4E8C-BE9C-13C550F1BED0}" type="slidenum">
               <a:rPr lang="de-CH" smtClean="0"/>
               <a:pPr/>
-              <a:t>‹Nr.›</a:t>
+              <a:t>‹#›</a:t>
             </a:fld>
             <a:endParaRPr lang="de-CH" dirty="0"/>
           </a:p>
@@ -6374,7 +6374,7 @@
             <a:fld id="{F19AE9A8-34D4-4E8C-BE9C-13C550F1BED0}" type="slidenum">
               <a:rPr lang="de-CH" smtClean="0"/>
               <a:pPr/>
-              <a:t>‹Nr.›</a:t>
+              <a:t>‹#›</a:t>
             </a:fld>
             <a:endParaRPr lang="de-CH" dirty="0"/>
           </a:p>
@@ -7551,7 +7551,7 @@
             <a:pPr lvl="1"/>
             <a:r>
               <a:rPr lang="de-CH" dirty="0" smtClean="0"/>
-              <a:t>Selbständiger</a:t>
+              <a:t>Selbständigeres Team</a:t>
             </a:r>
           </a:p>
           <a:p>
@@ -7565,7 +7565,15 @@
             <a:pPr lvl="2"/>
             <a:r>
               <a:rPr lang="de-CH" dirty="0" smtClean="0"/>
-              <a:t>Häufiges Pair Programming</a:t>
+              <a:t>Häufiges Pair </a:t>
+            </a:r>
+            <a:r>
+              <a:rPr lang="de-CH" dirty="0" err="1" smtClean="0"/>
+              <a:t>Programming</a:t>
+            </a:r>
+            <a:r>
+              <a:rPr lang="de-CH" dirty="0" smtClean="0"/>
+              <a:t> (kein Nachteil)</a:t>
             </a:r>
             <a:endParaRPr lang="de-CH" dirty="0"/>
           </a:p>
@@ -7670,40 +7678,36 @@
           <a:p>
             <a:r>
               <a:rPr lang="de-CH" dirty="0" smtClean="0"/>
-              <a:t>Tim </a:t>
-            </a:r>
+              <a:t>Tim Dorner</a:t>
+            </a:r>
+          </a:p>
+          <a:p>
+            <a:pPr lvl="1"/>
+            <a:r>
+              <a:rPr lang="de-CH" dirty="0" err="1"/>
+              <a:t>Scrum</a:t>
+            </a:r>
+            <a:r>
+              <a:rPr lang="de-CH" dirty="0"/>
+              <a:t> </a:t>
+            </a:r>
+            <a:r>
+              <a:rPr lang="de-CH" dirty="0" err="1" smtClean="0"/>
+              <a:t>planning</a:t>
+            </a:r>
+            <a:endParaRPr lang="de-CH" dirty="0"/>
+          </a:p>
+          <a:p>
+            <a:pPr lvl="1"/>
             <a:r>
               <a:rPr lang="de-CH" dirty="0" smtClean="0"/>
-              <a:t>Dorner</a:t>
-            </a:r>
-          </a:p>
-          <a:p>
-            <a:pPr lvl="1"/>
-            <a:r>
-              <a:rPr lang="de-CH" dirty="0" err="1" smtClean="0"/>
-              <a:t>Scrum</a:t>
-            </a:r>
-            <a:r>
-              <a:rPr lang="de-CH" dirty="0" smtClean="0"/>
-              <a:t> </a:t>
-            </a:r>
-            <a:r>
-              <a:rPr lang="de-CH" dirty="0" err="1" smtClean="0"/>
-              <a:t>planung</a:t>
-            </a:r>
-            <a:endParaRPr lang="de-CH" dirty="0" smtClean="0"/>
-          </a:p>
-          <a:p>
-            <a:pPr lvl="1"/>
-            <a:r>
-              <a:rPr lang="de-CH" dirty="0" smtClean="0"/>
-              <a:t>Paare </a:t>
-            </a:r>
-            <a:r>
-              <a:rPr lang="de-CH" dirty="0" err="1" smtClean="0"/>
+              <a:t>Pair </a:t>
+            </a:r>
+            <a:r>
+              <a:rPr lang="de-CH" dirty="0" err="1"/>
               <a:t>programming</a:t>
             </a:r>
-            <a:endParaRPr lang="de-CH" dirty="0" smtClean="0"/>
+            <a:endParaRPr lang="de-CH" dirty="0"/>
           </a:p>
           <a:p>
             <a:pPr lvl="1"/>
@@ -7721,7 +7725,38 @@
           <a:p>
             <a:r>
               <a:rPr lang="de-CH" dirty="0" smtClean="0"/>
-              <a:t>Stefan Iseli</a:t>
+              <a:t>Stefan </a:t>
+            </a:r>
+            <a:r>
+              <a:rPr lang="de-CH" dirty="0" smtClean="0"/>
+              <a:t>Iseli</a:t>
+            </a:r>
+          </a:p>
+          <a:p>
+            <a:pPr lvl="1"/>
+            <a:r>
+              <a:rPr lang="de-CH" dirty="0" smtClean="0"/>
+              <a:t>Storyboards &amp; </a:t>
+            </a:r>
+            <a:r>
+              <a:rPr lang="de-CH" dirty="0" err="1" smtClean="0"/>
+              <a:t>Requirements</a:t>
+            </a:r>
+            <a:endParaRPr lang="de-CH" dirty="0" smtClean="0"/>
+          </a:p>
+          <a:p>
+            <a:pPr lvl="1"/>
+            <a:r>
+              <a:rPr lang="de-CH" dirty="0" err="1" smtClean="0"/>
+              <a:t>Vaadin</a:t>
+            </a:r>
+            <a:r>
+              <a:rPr lang="de-CH" dirty="0"/>
+              <a:t> </a:t>
+            </a:r>
+            <a:r>
+              <a:rPr lang="de-CH" dirty="0" smtClean="0"/>
+              <a:t>&amp; JPA</a:t>
             </a:r>
             <a:endParaRPr lang="de-CH" dirty="0"/>
           </a:p>
@@ -8123,12 +8158,12 @@
           </a:p>
           <a:p>
             <a:r>
-              <a:rPr lang="de-CH" dirty="0"/>
-              <a:t>(</a:t>
+              <a:rPr lang="de-CH" dirty="0" err="1" smtClean="0"/>
+              <a:t>JUnit</a:t>
             </a:r>
             <a:r>
               <a:rPr lang="de-CH" dirty="0" smtClean="0"/>
-              <a:t>Tests davon)</a:t>
+              <a:t> Tests der Basisklassen</a:t>
             </a:r>
             <a:endParaRPr lang="de-CH" dirty="0"/>
           </a:p>
@@ -8186,7 +8221,7 @@
         </p:blipFill>
         <p:spPr>
           <a:xfrm>
-            <a:off x="468000" y="2653521"/>
+            <a:off x="468000" y="2938191"/>
             <a:ext cx="4855173" cy="3466478"/>
           </a:xfrm>
           <a:prstGeom prst="rect">
@@ -8337,6 +8372,16 @@
           <a:p>
             <a:r>
               <a:rPr lang="de-CH" dirty="0" err="1" smtClean="0"/>
+              <a:t>Scrum</a:t>
+            </a:r>
+            <a:r>
+              <a:rPr lang="de-CH" dirty="0" smtClean="0"/>
+              <a:t> Master Sprint 3</a:t>
+            </a:r>
+          </a:p>
+          <a:p>
+            <a:r>
+              <a:rPr lang="de-CH" dirty="0" err="1" smtClean="0"/>
               <a:t>Health</a:t>
             </a:r>
             <a:r>
@@ -8391,7 +8436,21 @@
           <a:p>
             <a:r>
               <a:rPr lang="de-CH" dirty="0" smtClean="0"/>
-              <a:t>Login Controller</a:t>
+              <a:t>Login</a:t>
+            </a:r>
+          </a:p>
+          <a:p>
+            <a:pPr lvl="1"/>
+            <a:r>
+              <a:rPr lang="de-CH" dirty="0" smtClean="0"/>
+              <a:t>Controller</a:t>
+            </a:r>
+          </a:p>
+          <a:p>
+            <a:pPr lvl="1"/>
+            <a:r>
+              <a:rPr lang="de-CH" dirty="0" smtClean="0"/>
+              <a:t>GUI</a:t>
             </a:r>
           </a:p>
           <a:p>
@@ -8552,7 +8611,117 @@
           <a:bodyPr/>
           <a:lstStyle/>
           <a:p>
+            <a:r>
+              <a:rPr lang="de-CH" dirty="0" err="1" smtClean="0"/>
+              <a:t>Scrum</a:t>
+            </a:r>
+            <a:r>
+              <a:rPr lang="de-CH" dirty="0" smtClean="0"/>
+              <a:t> Master Sprint 1 &amp; 2</a:t>
+            </a:r>
             <a:endParaRPr lang="de-CH" dirty="0"/>
+          </a:p>
+          <a:p>
+            <a:r>
+              <a:rPr lang="de-CH" dirty="0" smtClean="0"/>
+              <a:t>Patient State</a:t>
+            </a:r>
+          </a:p>
+          <a:p>
+            <a:r>
+              <a:rPr lang="de-CH" dirty="0" smtClean="0"/>
+              <a:t>Database</a:t>
+            </a:r>
+          </a:p>
+          <a:p>
+            <a:pPr lvl="1"/>
+            <a:r>
+              <a:rPr lang="de-CH" dirty="0" smtClean="0"/>
+              <a:t>DB erstellt und Daten eingefügt</a:t>
+            </a:r>
+          </a:p>
+          <a:p>
+            <a:pPr lvl="1"/>
+            <a:r>
+              <a:rPr lang="de-CH" dirty="0" smtClean="0"/>
+              <a:t>Klassen für JPA erweitert</a:t>
+            </a:r>
+          </a:p>
+          <a:p>
+            <a:pPr lvl="1"/>
+            <a:r>
+              <a:rPr lang="de-CH" dirty="0" smtClean="0"/>
+              <a:t>Connection, Read und Write</a:t>
+            </a:r>
+          </a:p>
+          <a:p>
+            <a:r>
+              <a:rPr lang="de-CH" dirty="0" err="1"/>
+              <a:t>Health</a:t>
+            </a:r>
+            <a:r>
+              <a:rPr lang="de-CH" dirty="0"/>
+              <a:t> </a:t>
+            </a:r>
+            <a:r>
+              <a:rPr lang="de-CH" dirty="0" err="1"/>
+              <a:t>Visitor</a:t>
+            </a:r>
+            <a:r>
+              <a:rPr lang="de-CH" dirty="0"/>
+              <a:t> </a:t>
+            </a:r>
+            <a:r>
+              <a:rPr lang="de-CH" dirty="0" smtClean="0"/>
+              <a:t>Kalender</a:t>
+            </a:r>
+          </a:p>
+          <a:p>
+            <a:r>
+              <a:rPr lang="de-CH" dirty="0" smtClean="0"/>
+              <a:t>Patient List</a:t>
+            </a:r>
+          </a:p>
+          <a:p>
+            <a:r>
+              <a:rPr lang="de-CH" dirty="0" smtClean="0"/>
+              <a:t>Login Controller</a:t>
+            </a:r>
+          </a:p>
+          <a:p>
+            <a:pPr lvl="1"/>
+            <a:r>
+              <a:rPr lang="de-CH" smtClean="0"/>
+              <a:t>Login mit </a:t>
+            </a:r>
+            <a:r>
+              <a:rPr lang="de-CH" dirty="0" smtClean="0"/>
+              <a:t>DB</a:t>
+            </a:r>
+          </a:p>
+          <a:p>
+            <a:r>
+              <a:rPr lang="de-CH" dirty="0" smtClean="0"/>
+              <a:t>Edit Patient</a:t>
+            </a:r>
+          </a:p>
+          <a:p>
+            <a:r>
+              <a:rPr lang="de-CH" dirty="0" smtClean="0"/>
+              <a:t>Etc.</a:t>
+            </a:r>
+          </a:p>
+          <a:p>
+            <a:endParaRPr lang="de-CH" dirty="0"/>
+          </a:p>
+          <a:p>
+            <a:endParaRPr lang="de-CH" dirty="0" smtClean="0"/>
+          </a:p>
+          <a:p>
+            <a:endParaRPr lang="de-CH" dirty="0" smtClean="0"/>
+          </a:p>
+          <a:p>
+            <a:endParaRPr lang="de-CH" dirty="0" smtClean="0"/>
           </a:p>
         </p:txBody>
       </p:sp>
@@ -9423,23 +9592,6 @@
 </file>
 
 <file path=customXml/item1.xml><?xml version="1.0" encoding="utf-8"?>
-<p:properties xmlns:p="http://schemas.microsoft.com/office/2006/metadata/properties" xmlns:xsi="http://www.w3.org/2001/XMLSchema-instance">
-  <documentManagement>
-    <AVMTitle xmlns="5091c847-84be-4f4f-b16c-c018ad2ca66b">Präsentation BFH_2013</AVMTitle>
-  </documentManagement>
-</p:properties>
-</file>
-
-<file path=customXml/item2.xml><?xml version="1.0" encoding="utf-8"?>
-<?mso-contentType ?>
-<FormTemplates xmlns="http://schemas.microsoft.com/sharepoint/v3/contenttype/forms">
-  <Display>DocumentLibraryForm</Display>
-  <Edit>DocumentLibraryForm</Edit>
-  <New>DocumentLibraryForm</New>
-</FormTemplates>
-</file>
-
-<file path=customXml/item3.xml><?xml version="1.0" encoding="utf-8"?>
 <ct:contentTypeSchema xmlns:ct="http://schemas.microsoft.com/office/2006/metadata/contentType" xmlns:ma="http://schemas.microsoft.com/office/2006/metadata/properties/metaAttributes" ct:_="" ma:_="" ma:contentTypeName="Dokument" ma:contentTypeID="0x010100EBE3A9EFF36793468C03E2811ACE2A2B" ma:contentTypeVersion="1" ma:contentTypeDescription="Ein neues Dokument erstellen." ma:contentTypeScope="" ma:versionID="e65be32cb1bfff77fc8c9c09bf542651">
   <xsd:schema xmlns:xsd="http://www.w3.org/2001/XMLSchema" xmlns:p="http://schemas.microsoft.com/office/2006/metadata/properties" xmlns:ns2="5091c847-84be-4f4f-b16c-c018ad2ca66b" targetNamespace="http://schemas.microsoft.com/office/2006/metadata/properties" ma:root="true" ma:fieldsID="7636c84aed5b7d09a166fcef888725d4" ns2:_="">
     <xsd:import namespace="5091c847-84be-4f4f-b16c-c018ad2ca66b"/>
@@ -9499,30 +9651,24 @@
 </ct:contentTypeSchema>
 </file>
 
-<file path=customXml/itemProps1.xml><?xml version="1.0" encoding="utf-8"?>
-<ds:datastoreItem xmlns:ds="http://schemas.openxmlformats.org/officeDocument/2006/customXml" ds:itemID="{32991507-CB83-4F49-BAFB-D322B1D04098}">
-  <ds:schemaRefs>
-    <ds:schemaRef ds:uri="http://purl.org/dc/terms/"/>
-    <ds:schemaRef ds:uri="http://schemas.openxmlformats.org/package/2006/metadata/core-properties"/>
-    <ds:schemaRef ds:uri="http://schemas.microsoft.com/office/2006/documentManagement/types"/>
-    <ds:schemaRef ds:uri="5091c847-84be-4f4f-b16c-c018ad2ca66b"/>
-    <ds:schemaRef ds:uri="http://purl.org/dc/elements/1.1/"/>
-    <ds:schemaRef ds:uri="http://schemas.microsoft.com/office/2006/metadata/properties"/>
-    <ds:schemaRef ds:uri="http://www.w3.org/XML/1998/namespace"/>
-    <ds:schemaRef ds:uri="http://purl.org/dc/dcmitype/"/>
-  </ds:schemaRefs>
-</ds:datastoreItem>
+<file path=customXml/item2.xml><?xml version="1.0" encoding="utf-8"?>
+<?mso-contentType ?>
+<FormTemplates xmlns="http://schemas.microsoft.com/sharepoint/v3/contenttype/forms">
+  <Display>DocumentLibraryForm</Display>
+  <Edit>DocumentLibraryForm</Edit>
+  <New>DocumentLibraryForm</New>
+</FormTemplates>
 </file>
 
-<file path=customXml/itemProps2.xml><?xml version="1.0" encoding="utf-8"?>
-<ds:datastoreItem xmlns:ds="http://schemas.openxmlformats.org/officeDocument/2006/customXml" ds:itemID="{1851D33F-E468-417B-A30C-509B68D2BD09}">
-  <ds:schemaRefs>
-    <ds:schemaRef ds:uri="http://schemas.microsoft.com/sharepoint/v3/contenttype/forms"/>
-  </ds:schemaRefs>
-</ds:datastoreItem>
+<file path=customXml/item3.xml><?xml version="1.0" encoding="utf-8"?>
+<p:properties xmlns:p="http://schemas.microsoft.com/office/2006/metadata/properties" xmlns:xsi="http://www.w3.org/2001/XMLSchema-instance">
+  <documentManagement>
+    <AVMTitle xmlns="5091c847-84be-4f4f-b16c-c018ad2ca66b">Präsentation BFH_2013</AVMTitle>
+  </documentManagement>
+</p:properties>
 </file>
 
-<file path=customXml/itemProps3.xml><?xml version="1.0" encoding="utf-8"?>
+<file path=customXml/itemProps1.xml><?xml version="1.0" encoding="utf-8"?>
 <ds:datastoreItem xmlns:ds="http://schemas.openxmlformats.org/officeDocument/2006/customXml" ds:itemID="{15287BEA-F3FF-4B87-929B-5D0092183197}">
   <ds:schemaRefs>
     <ds:schemaRef ds:uri="http://schemas.microsoft.com/office/2006/metadata/contentType"/>
@@ -9537,4 +9683,27 @@
     <ds:schemaRef ds:uri="http://schemas.microsoft.com/office/internal/2005/internalDocumentation"/>
   </ds:schemaRefs>
 </ds:datastoreItem>
+</file>
+
+<file path=customXml/itemProps2.xml><?xml version="1.0" encoding="utf-8"?>
+<ds:datastoreItem xmlns:ds="http://schemas.openxmlformats.org/officeDocument/2006/customXml" ds:itemID="{1851D33F-E468-417B-A30C-509B68D2BD09}">
+  <ds:schemaRefs>
+    <ds:schemaRef ds:uri="http://schemas.microsoft.com/sharepoint/v3/contenttype/forms"/>
+  </ds:schemaRefs>
+</ds:datastoreItem>
+</file>
+
+<file path=customXml/itemProps3.xml><?xml version="1.0" encoding="utf-8"?>
+<ds:datastoreItem xmlns:ds="http://schemas.openxmlformats.org/officeDocument/2006/customXml" ds:itemID="{32991507-CB83-4F49-BAFB-D322B1D04098}">
+  <ds:schemaRefs>
+    <ds:schemaRef ds:uri="http://purl.org/dc/terms/"/>
+    <ds:schemaRef ds:uri="http://schemas.openxmlformats.org/package/2006/metadata/core-properties"/>
+    <ds:schemaRef ds:uri="http://schemas.microsoft.com/office/2006/documentManagement/types"/>
+    <ds:schemaRef ds:uri="5091c847-84be-4f4f-b16c-c018ad2ca66b"/>
+    <ds:schemaRef ds:uri="http://purl.org/dc/elements/1.1/"/>
+    <ds:schemaRef ds:uri="http://schemas.microsoft.com/office/2006/metadata/properties"/>
+    <ds:schemaRef ds:uri="http://www.w3.org/XML/1998/namespace"/>
+    <ds:schemaRef ds:uri="http://purl.org/dc/dcmitype/"/>
+  </ds:schemaRefs>
+</ds:datastoreItem>
 </file>
</xml_diff>

<commit_message>
final presentation and diary
</commit_message>
<xml_diff>
--- a/doc/task14/Task14.pptx
+++ b/doc/task14/Task14.pptx
@@ -6940,11 +6940,7 @@
           <a:p>
             <a:r>
               <a:rPr lang="de-CH" b="1" smtClean="0"/>
-              <a:t>21</a:t>
-            </a:r>
-            <a:r>
-              <a:rPr lang="de-CH" b="1" smtClean="0"/>
-              <a:t>.01.2016</a:t>
+              <a:t>21.01.2016</a:t>
             </a:r>
             <a:r>
               <a:rPr lang="de-CH" b="1" dirty="0" smtClean="0"/>
@@ -6976,6 +6972,45 @@
           </a:p>
         </p:txBody>
       </p:sp>
+      <p:pic>
+        <p:nvPicPr>
+          <p:cNvPr id="1030" name="Picture 6" descr="http://game-solver.com/wp-content/uploads/2015/04/Guess-Up-Emoji-Wet-Willy.png"/>
+          <p:cNvPicPr>
+            <a:picLocks noChangeAspect="1" noChangeArrowheads="1"/>
+          </p:cNvPicPr>
+          <p:nvPr/>
+        </p:nvPicPr>
+        <p:blipFill rotWithShape="1">
+          <a:blip r:embed="rId3">
+            <a:extLst>
+              <a:ext uri="{28A0092B-C50C-407E-A947-70E740481C1C}">
+                <a14:useLocalDpi xmlns:a14="http://schemas.microsoft.com/office/drawing/2010/main" val="0"/>
+              </a:ext>
+            </a:extLst>
+          </a:blip>
+          <a:srcRect l="48617"/>
+          <a:stretch/>
+        </p:blipFill>
+        <p:spPr bwMode="auto">
+          <a:xfrm>
+            <a:off x="4104169" y="1839808"/>
+            <a:ext cx="2491192" cy="2424131"/>
+          </a:xfrm>
+          <a:prstGeom prst="rect">
+            <a:avLst/>
+          </a:prstGeom>
+          <a:noFill/>
+          <a:extLst>
+            <a:ext uri="{909E8E84-426E-40DD-AFC4-6F175D3DCCD1}">
+              <a14:hiddenFill xmlns:a14="http://schemas.microsoft.com/office/drawing/2010/main">
+                <a:solidFill>
+                  <a:srgbClr val="FFFFFF"/>
+                </a:solidFill>
+              </a14:hiddenFill>
+            </a:ext>
+          </a:extLst>
+        </p:spPr>
+      </p:pic>
     </p:spTree>
     <p:extLst>
       <p:ext uri="{BB962C8B-B14F-4D97-AF65-F5344CB8AC3E}">
@@ -7967,11 +8002,7 @@
             <a:pPr lvl="2"/>
             <a:r>
               <a:rPr lang="de-CH" dirty="0" smtClean="0"/>
-              <a:t>Wirklich nur «was gemacht», «was als nächstes</a:t>
-            </a:r>
-            <a:r>
-              <a:rPr lang="de-CH" dirty="0" smtClean="0"/>
-              <a:t>»</a:t>
+              <a:t>Wirklich nur «was gemacht», «was als nächstes»</a:t>
             </a:r>
             <a:endParaRPr lang="de-CH" dirty="0"/>
           </a:p>
@@ -8059,11 +8090,7 @@
             </a:r>
             <a:r>
               <a:rPr lang="de-CH" dirty="0" smtClean="0"/>
-              <a:t> </a:t>
-            </a:r>
-            <a:r>
-              <a:rPr lang="de-CH" dirty="0" smtClean="0"/>
-              <a:t>Master</a:t>
+              <a:t> Master</a:t>
             </a:r>
           </a:p>
           <a:p>
@@ -8214,7 +8241,6 @@
               <a:rPr lang="de-CH" dirty="0" smtClean="0"/>
               <a:t>Zusammenarbeit Team (Niveau-Unterschiede)</a:t>
             </a:r>
-            <a:endParaRPr lang="de-CH" dirty="0" smtClean="0"/>
           </a:p>
           <a:p>
             <a:pPr marL="0" indent="0">
@@ -8239,11 +8265,7 @@
             <a:pPr lvl="1"/>
             <a:r>
               <a:rPr lang="de-CH" dirty="0" smtClean="0"/>
-              <a:t>Durchführung Projekt mit mehreren </a:t>
-            </a:r>
-            <a:r>
-              <a:rPr lang="de-CH" dirty="0" smtClean="0"/>
-              <a:t>Leuten</a:t>
+              <a:t>Durchführung Projekt mit mehreren Leuten</a:t>
             </a:r>
           </a:p>
           <a:p>
@@ -8472,11 +8494,7 @@
           <a:p>
             <a:r>
               <a:rPr lang="de-CH" dirty="0" smtClean="0"/>
-              <a:t>Fabian </a:t>
-            </a:r>
-            <a:r>
-              <a:rPr lang="de-CH" dirty="0" smtClean="0"/>
-              <a:t>Zwahlen</a:t>
+              <a:t>Fabian Zwahlen</a:t>
             </a:r>
           </a:p>
           <a:p>
@@ -8490,11 +8508,7 @@
             <a:pPr lvl="1"/>
             <a:r>
               <a:rPr lang="de-CH" dirty="0" smtClean="0"/>
-              <a:t>Aufteilung der </a:t>
-            </a:r>
-            <a:r>
-              <a:rPr lang="de-CH" dirty="0" smtClean="0"/>
-              <a:t>Arbeiten</a:t>
+              <a:t>Aufteilung der Arbeiten</a:t>
             </a:r>
           </a:p>
           <a:p>
@@ -10258,12 +10272,11 @@
 </file>
 
 <file path=customXml/item1.xml><?xml version="1.0" encoding="utf-8"?>
-<?mso-contentType ?>
-<FormTemplates xmlns="http://schemas.microsoft.com/sharepoint/v3/contenttype/forms">
-  <Display>DocumentLibraryForm</Display>
-  <Edit>DocumentLibraryForm</Edit>
-  <New>DocumentLibraryForm</New>
-</FormTemplates>
+<p:properties xmlns:p="http://schemas.microsoft.com/office/2006/metadata/properties" xmlns:xsi="http://www.w3.org/2001/XMLSchema-instance">
+  <documentManagement>
+    <AVMTitle xmlns="5091c847-84be-4f4f-b16c-c018ad2ca66b">Präsentation BFH_2013</AVMTitle>
+  </documentManagement>
+</p:properties>
 </file>
 
 <file path=customXml/item2.xml><?xml version="1.0" encoding="utf-8"?>
@@ -10327,17 +10340,25 @@
 </file>
 
 <file path=customXml/item3.xml><?xml version="1.0" encoding="utf-8"?>
-<p:properties xmlns:p="http://schemas.microsoft.com/office/2006/metadata/properties" xmlns:xsi="http://www.w3.org/2001/XMLSchema-instance">
-  <documentManagement>
-    <AVMTitle xmlns="5091c847-84be-4f4f-b16c-c018ad2ca66b">Präsentation BFH_2013</AVMTitle>
-  </documentManagement>
-</p:properties>
+<?mso-contentType ?>
+<FormTemplates xmlns="http://schemas.microsoft.com/sharepoint/v3/contenttype/forms">
+  <Display>DocumentLibraryForm</Display>
+  <Edit>DocumentLibraryForm</Edit>
+  <New>DocumentLibraryForm</New>
+</FormTemplates>
 </file>
 
 <file path=customXml/itemProps1.xml><?xml version="1.0" encoding="utf-8"?>
-<ds:datastoreItem xmlns:ds="http://schemas.openxmlformats.org/officeDocument/2006/customXml" ds:itemID="{1851D33F-E468-417B-A30C-509B68D2BD09}">
+<ds:datastoreItem xmlns:ds="http://schemas.openxmlformats.org/officeDocument/2006/customXml" ds:itemID="{32991507-CB83-4F49-BAFB-D322B1D04098}">
   <ds:schemaRefs>
-    <ds:schemaRef ds:uri="http://schemas.microsoft.com/sharepoint/v3/contenttype/forms"/>
+    <ds:schemaRef ds:uri="http://purl.org/dc/terms/"/>
+    <ds:schemaRef ds:uri="http://schemas.openxmlformats.org/package/2006/metadata/core-properties"/>
+    <ds:schemaRef ds:uri="http://schemas.microsoft.com/office/2006/documentManagement/types"/>
+    <ds:schemaRef ds:uri="5091c847-84be-4f4f-b16c-c018ad2ca66b"/>
+    <ds:schemaRef ds:uri="http://purl.org/dc/elements/1.1/"/>
+    <ds:schemaRef ds:uri="http://schemas.microsoft.com/office/2006/metadata/properties"/>
+    <ds:schemaRef ds:uri="http://www.w3.org/XML/1998/namespace"/>
+    <ds:schemaRef ds:uri="http://purl.org/dc/dcmitype/"/>
   </ds:schemaRefs>
 </ds:datastoreItem>
 </file>
@@ -10360,16 +10381,9 @@
 </file>
 
 <file path=customXml/itemProps3.xml><?xml version="1.0" encoding="utf-8"?>
-<ds:datastoreItem xmlns:ds="http://schemas.openxmlformats.org/officeDocument/2006/customXml" ds:itemID="{32991507-CB83-4F49-BAFB-D322B1D04098}">
+<ds:datastoreItem xmlns:ds="http://schemas.openxmlformats.org/officeDocument/2006/customXml" ds:itemID="{1851D33F-E468-417B-A30C-509B68D2BD09}">
   <ds:schemaRefs>
-    <ds:schemaRef ds:uri="http://purl.org/dc/terms/"/>
-    <ds:schemaRef ds:uri="http://schemas.openxmlformats.org/package/2006/metadata/core-properties"/>
-    <ds:schemaRef ds:uri="http://schemas.microsoft.com/office/2006/documentManagement/types"/>
-    <ds:schemaRef ds:uri="5091c847-84be-4f4f-b16c-c018ad2ca66b"/>
-    <ds:schemaRef ds:uri="http://purl.org/dc/elements/1.1/"/>
-    <ds:schemaRef ds:uri="http://schemas.microsoft.com/office/2006/metadata/properties"/>
-    <ds:schemaRef ds:uri="http://www.w3.org/XML/1998/namespace"/>
-    <ds:schemaRef ds:uri="http://purl.org/dc/dcmitype/"/>
+    <ds:schemaRef ds:uri="http://schemas.microsoft.com/sharepoint/v3/contenttype/forms"/>
   </ds:schemaRefs>
 </ds:datastoreItem>
 </file>
</xml_diff>